<commit_message>
Improved functional overview for wiki
</commit_message>
<xml_diff>
--- a/logtest-wiki/src/main/resources/images/sketches.pptx
+++ b/logtest-wiki/src/main/resources/images/sketches.pptx
@@ -104,6 +104,11 @@
       </a:defRPr>
     </a:lvl9pPr>
   </p:defaultTextStyle>
+  <p:extLst>
+    <p:ext uri="{EFAFB233-063F-42B5-8137-9DF3F51BA10A}">
+      <p15:sldGuideLst xmlns:p15="http://schemas.microsoft.com/office/powerpoint/2012/main"/>
+    </p:ext>
+  </p:extLst>
 </p:presentation>
 </file>
 
@@ -152,7 +157,6 @@
               <a:rPr lang="de-DE"/>
               <a:t>Titelmasterformat durch Klicken bearbeiten</a:t>
             </a:r>
-            <a:endParaRPr lang="de-DE"/>
           </a:p>
         </p:txBody>
       </p:sp>
@@ -217,7 +221,6 @@
               <a:rPr lang="de-DE"/>
               <a:t>Formatvorlage des Untertitelmasters durch Klicken bearbeiten</a:t>
             </a:r>
-            <a:endParaRPr lang="de-DE"/>
           </a:p>
         </p:txBody>
       </p:sp>
@@ -335,7 +338,6 @@
               <a:rPr lang="de-DE"/>
               <a:t>Titelmasterformat durch Klicken bearbeiten</a:t>
             </a:r>
-            <a:endParaRPr lang="de-DE"/>
           </a:p>
         </p:txBody>
       </p:sp>
@@ -387,7 +389,6 @@
               <a:rPr lang="de-DE"/>
               <a:t>Fünfte Ebene</a:t>
             </a:r>
-            <a:endParaRPr lang="de-DE"/>
           </a:p>
         </p:txBody>
       </p:sp>
@@ -510,7 +511,6 @@
               <a:rPr lang="de-DE"/>
               <a:t>Titelmasterformat durch Klicken bearbeiten</a:t>
             </a:r>
-            <a:endParaRPr lang="de-DE"/>
           </a:p>
         </p:txBody>
       </p:sp>
@@ -567,7 +567,6 @@
               <a:rPr lang="de-DE"/>
               <a:t>Fünfte Ebene</a:t>
             </a:r>
-            <a:endParaRPr lang="de-DE"/>
           </a:p>
         </p:txBody>
       </p:sp>
@@ -685,7 +684,6 @@
               <a:rPr lang="de-DE"/>
               <a:t>Titelmasterformat durch Klicken bearbeiten</a:t>
             </a:r>
-            <a:endParaRPr lang="de-DE"/>
           </a:p>
         </p:txBody>
       </p:sp>
@@ -737,7 +735,6 @@
               <a:rPr lang="de-DE"/>
               <a:t>Fünfte Ebene</a:t>
             </a:r>
-            <a:endParaRPr lang="de-DE"/>
           </a:p>
         </p:txBody>
       </p:sp>
@@ -864,7 +861,6 @@
               <a:rPr lang="de-DE"/>
               <a:t>Titelmasterformat durch Klicken bearbeiten</a:t>
             </a:r>
-            <a:endParaRPr lang="de-DE"/>
           </a:p>
         </p:txBody>
       </p:sp>
@@ -1101,7 +1097,6 @@
               <a:rPr lang="de-DE"/>
               <a:t>Titelmasterformat durch Klicken bearbeiten</a:t>
             </a:r>
-            <a:endParaRPr lang="de-DE"/>
           </a:p>
         </p:txBody>
       </p:sp>
@@ -1158,7 +1153,6 @@
               <a:rPr lang="de-DE"/>
               <a:t>Fünfte Ebene</a:t>
             </a:r>
-            <a:endParaRPr lang="de-DE"/>
           </a:p>
         </p:txBody>
       </p:sp>
@@ -1215,7 +1209,6 @@
               <a:rPr lang="de-DE"/>
               <a:t>Fünfte Ebene</a:t>
             </a:r>
-            <a:endParaRPr lang="de-DE"/>
           </a:p>
         </p:txBody>
       </p:sp>
@@ -1338,7 +1331,6 @@
               <a:rPr lang="de-DE"/>
               <a:t>Titelmasterformat durch Klicken bearbeiten</a:t>
             </a:r>
-            <a:endParaRPr lang="de-DE"/>
           </a:p>
         </p:txBody>
       </p:sp>
@@ -1460,7 +1452,6 @@
               <a:rPr lang="de-DE"/>
               <a:t>Fünfte Ebene</a:t>
             </a:r>
-            <a:endParaRPr lang="de-DE"/>
           </a:p>
         </p:txBody>
       </p:sp>
@@ -1582,7 +1573,6 @@
               <a:rPr lang="de-DE"/>
               <a:t>Fünfte Ebene</a:t>
             </a:r>
-            <a:endParaRPr lang="de-DE"/>
           </a:p>
         </p:txBody>
       </p:sp>
@@ -1700,7 +1690,6 @@
               <a:rPr lang="de-DE"/>
               <a:t>Titelmasterformat durch Klicken bearbeiten</a:t>
             </a:r>
-            <a:endParaRPr lang="de-DE"/>
           </a:p>
         </p:txBody>
       </p:sp>
@@ -1922,7 +1911,6 @@
               <a:rPr lang="de-DE"/>
               <a:t>Titelmasterformat durch Klicken bearbeiten</a:t>
             </a:r>
-            <a:endParaRPr lang="de-DE"/>
           </a:p>
         </p:txBody>
       </p:sp>
@@ -2007,7 +1995,6 @@
               <a:rPr lang="de-DE"/>
               <a:t>Fünfte Ebene</a:t>
             </a:r>
-            <a:endParaRPr lang="de-DE"/>
           </a:p>
         </p:txBody>
       </p:sp>
@@ -2199,7 +2186,6 @@
               <a:rPr lang="de-DE"/>
               <a:t>Titelmasterformat durch Klicken bearbeiten</a:t>
             </a:r>
-            <a:endParaRPr lang="de-DE"/>
           </a:p>
         </p:txBody>
       </p:sp>
@@ -2458,7 +2444,6 @@
               <a:rPr lang="de-DE"/>
               <a:t>Titelmasterformat durch Klicken bearbeiten</a:t>
             </a:r>
-            <a:endParaRPr lang="de-DE"/>
           </a:p>
         </p:txBody>
       </p:sp>
@@ -2520,7 +2505,6 @@
               <a:rPr lang="de-DE"/>
               <a:t>Fünfte Ebene</a:t>
             </a:r>
-            <a:endParaRPr lang="de-DE"/>
           </a:p>
         </p:txBody>
       </p:sp>
@@ -2966,7 +2950,7 @@
       </p:grpSpPr>
       <p:sp>
         <p:nvSpPr>
-          <p:cNvPr id="45" name="Stern: 8 Zacken 44"/>
+          <p:cNvPr id="20" name="Stern: 8 Zacken 19"/>
           <p:cNvSpPr/>
           <p:nvPr/>
         </p:nvSpPr>
@@ -3028,7 +3012,7 @@
       </p:sp>
       <p:sp>
         <p:nvSpPr>
-          <p:cNvPr id="5" name="Pfeil: nach rechts 4"/>
+          <p:cNvPr id="21" name="Pfeil: nach rechts 20"/>
           <p:cNvSpPr/>
           <p:nvPr/>
         </p:nvSpPr>
@@ -3079,7 +3063,7 @@
       </p:sp>
       <p:sp>
         <p:nvSpPr>
-          <p:cNvPr id="4" name="Rechteck 3"/>
+          <p:cNvPr id="23" name="Rechteck 22"/>
           <p:cNvSpPr/>
           <p:nvPr/>
         </p:nvSpPr>
@@ -3131,7 +3115,7 @@
       </p:sp>
       <p:sp>
         <p:nvSpPr>
-          <p:cNvPr id="6" name="Rechteck 5"/>
+          <p:cNvPr id="26" name="Rechteck 25"/>
           <p:cNvSpPr/>
           <p:nvPr/>
         </p:nvSpPr>
@@ -3183,7 +3167,7 @@
       </p:sp>
       <p:sp>
         <p:nvSpPr>
-          <p:cNvPr id="7" name="Rechteck 6"/>
+          <p:cNvPr id="27" name="Rechteck 26"/>
           <p:cNvSpPr/>
           <p:nvPr/>
         </p:nvSpPr>
@@ -3243,7 +3227,7 @@
       </p:sp>
       <p:sp>
         <p:nvSpPr>
-          <p:cNvPr id="8" name="Pfeil: nach rechts 7"/>
+          <p:cNvPr id="28" name="Pfeil: nach rechts 27"/>
           <p:cNvSpPr/>
           <p:nvPr/>
         </p:nvSpPr>
@@ -3285,7 +3269,7 @@
       </p:sp>
       <p:sp>
         <p:nvSpPr>
-          <p:cNvPr id="9" name="Rechteck 8"/>
+          <p:cNvPr id="29" name="Rechteck 28"/>
           <p:cNvSpPr/>
           <p:nvPr/>
         </p:nvSpPr>
@@ -3361,7 +3345,7 @@
       </p:sp>
       <p:sp>
         <p:nvSpPr>
-          <p:cNvPr id="10" name="Rechteck 9"/>
+          <p:cNvPr id="30" name="Rechteck 29"/>
           <p:cNvSpPr/>
           <p:nvPr/>
         </p:nvSpPr>
@@ -3436,7 +3420,7 @@
       </p:sp>
       <p:sp>
         <p:nvSpPr>
-          <p:cNvPr id="11" name="Rechteck 10"/>
+          <p:cNvPr id="31" name="Rechteck 30"/>
           <p:cNvSpPr/>
           <p:nvPr/>
         </p:nvSpPr>
@@ -3507,7 +3491,7 @@
       </p:sp>
       <p:cxnSp>
         <p:nvCxnSpPr>
-          <p:cNvPr id="13" name="Gerader Verbinder 12"/>
+          <p:cNvPr id="34" name="Gerader Verbinder 33"/>
           <p:cNvCxnSpPr/>
           <p:nvPr/>
         </p:nvCxnSpPr>
@@ -3540,7 +3524,7 @@
       </p:cxnSp>
       <p:cxnSp>
         <p:nvCxnSpPr>
-          <p:cNvPr id="15" name="Gerader Verbinder 14"/>
+          <p:cNvPr id="36" name="Gerader Verbinder 35"/>
           <p:cNvCxnSpPr/>
           <p:nvPr/>
         </p:nvCxnSpPr>
@@ -3573,7 +3557,7 @@
       </p:cxnSp>
       <p:cxnSp>
         <p:nvCxnSpPr>
-          <p:cNvPr id="22" name="Gerade Verbindung mit Pfeil 21"/>
+          <p:cNvPr id="37" name="Gerade Verbindung mit Pfeil 36"/>
           <p:cNvCxnSpPr/>
           <p:nvPr/>
         </p:nvCxnSpPr>
@@ -3606,7 +3590,7 @@
       </p:cxnSp>
       <p:sp>
         <p:nvSpPr>
-          <p:cNvPr id="24" name="Flussdiagramm: Karte 23"/>
+          <p:cNvPr id="38" name="Flussdiagramm: Karte 37"/>
           <p:cNvSpPr/>
           <p:nvPr/>
         </p:nvSpPr>
@@ -3665,14 +3649,14 @@
       </p:sp>
       <p:sp>
         <p:nvSpPr>
-          <p:cNvPr id="25" name="Rechteck 24"/>
+          <p:cNvPr id="40" name="Rechteck 39"/>
           <p:cNvSpPr/>
           <p:nvPr/>
         </p:nvSpPr>
         <p:spPr>
           <a:xfrm>
-            <a:off x="7344030" y="4510216"/>
-            <a:ext cx="1363362" cy="766119"/>
+            <a:off x="7344029" y="4510216"/>
+            <a:ext cx="1424189" cy="951132"/>
           </a:xfrm>
           <a:prstGeom prst="rect">
             <a:avLst/>
@@ -3704,22 +3688,37 @@
             <a:pPr algn="ctr"/>
             <a:r>
               <a:rPr lang="de-DE" dirty="0" err="1"/>
-              <a:t>logtest</a:t>
+              <a:t>Expected</a:t>
+            </a:r>
+            <a:r>
+              <a:rPr lang="de-DE" dirty="0"/>
+              <a:t> </a:t>
+            </a:r>
+            <a:r>
+              <a:rPr lang="de-DE" dirty="0" err="1"/>
+              <a:t>Behavior</a:t>
             </a:r>
             <a:br>
               <a:rPr lang="de-DE" dirty="0"/>
             </a:br>
             <a:r>
+              <a:rPr lang="de-DE" dirty="0"/>
+              <a:t>(</a:t>
+            </a:r>
+            <a:r>
               <a:rPr lang="de-DE" dirty="0" err="1"/>
               <a:t>Automaton</a:t>
             </a:r>
-            <a:endParaRPr lang="de-DE" dirty="0"/>
+            <a:r>
+              <a:rPr lang="de-DE" dirty="0"/>
+              <a:t>)</a:t>
+            </a:r>
           </a:p>
         </p:txBody>
       </p:sp>
       <p:cxnSp>
         <p:nvCxnSpPr>
-          <p:cNvPr id="32" name="Gerade Verbindung mit Pfeil 31"/>
+          <p:cNvPr id="41" name="Gerade Verbindung mit Pfeil 40"/>
           <p:cNvCxnSpPr/>
           <p:nvPr/>
         </p:nvCxnSpPr>
@@ -3752,7 +3751,7 @@
       </p:cxnSp>
       <p:sp>
         <p:nvSpPr>
-          <p:cNvPr id="33" name="Textfeld 32"/>
+          <p:cNvPr id="42" name="Textfeld 41"/>
           <p:cNvSpPr txBox="1"/>
           <p:nvPr/>
         </p:nvSpPr>
@@ -3781,7 +3780,7 @@
       </p:sp>
       <p:cxnSp>
         <p:nvCxnSpPr>
-          <p:cNvPr id="35" name="Gerade Verbindung mit Pfeil 34"/>
+          <p:cNvPr id="43" name="Gerade Verbindung mit Pfeil 42"/>
           <p:cNvCxnSpPr/>
           <p:nvPr/>
         </p:nvCxnSpPr>
@@ -3814,14 +3813,14 @@
       </p:cxnSp>
       <p:sp>
         <p:nvSpPr>
-          <p:cNvPr id="39" name="Textfeld 38"/>
+          <p:cNvPr id="44" name="Textfeld 43"/>
           <p:cNvSpPr txBox="1"/>
           <p:nvPr/>
         </p:nvSpPr>
         <p:spPr>
           <a:xfrm>
             <a:off x="7998939" y="3664465"/>
-            <a:ext cx="877933" cy="369332"/>
+            <a:ext cx="984565" cy="369332"/>
           </a:xfrm>
           <a:prstGeom prst="rect">
             <a:avLst/>
@@ -3835,10 +3834,9 @@
           <a:lstStyle/>
           <a:p>
             <a:r>
-              <a:rPr lang="de-DE" dirty="0" err="1"/>
-              <a:t>Yes|No</a:t>
-            </a:r>
-            <a:endParaRPr lang="de-DE" dirty="0"/>
+              <a:rPr lang="de-DE" dirty="0"/>
+              <a:t>OK|NOK</a:t>
+            </a:r>
           </a:p>
         </p:txBody>
       </p:sp>

</xml_diff>